<commit_message>
Solve link and r issue for pptx
</commit_message>
<xml_diff>
--- a/samples/test.pptx
+++ b/samples/test.pptx
@@ -8,6 +8,7 @@
     <p:sldId id="256" r:id="rId2"/>
     <p:sldId id="257" r:id="rId3"/>
     <p:sldId id="258" r:id="rId4"/>
+    <p:sldId id="259" r:id="rId5"/>
   </p:sldIdLst>
   <p:sldSz cx="12192000" cy="6858000"/>
   <p:notesSz cx="6858000" cy="9144000"/>
@@ -290,7 +291,7 @@
           <a:p>
             <a:fld id="{C764DE79-268F-4C1A-8933-263129D2AF90}" type="datetimeFigureOut">
               <a:rPr lang="en-US" dirty="0"/>
-              <a:t>1/11/2025</a:t>
+              <a:t>1/13/25</a:t>
             </a:fld>
             <a:endParaRPr lang="en-US" dirty="0"/>
           </a:p>
@@ -455,7 +456,7 @@
           <a:p>
             <a:fld id="{C764DE79-268F-4C1A-8933-263129D2AF90}" type="datetimeFigureOut">
               <a:rPr lang="en-US" dirty="0"/>
-              <a:t>1/11/2025</a:t>
+              <a:t>1/13/25</a:t>
             </a:fld>
             <a:endParaRPr lang="en-US" dirty="0"/>
           </a:p>
@@ -630,7 +631,7 @@
           <a:p>
             <a:fld id="{C764DE79-268F-4C1A-8933-263129D2AF90}" type="datetimeFigureOut">
               <a:rPr lang="en-US" dirty="0"/>
-              <a:t>1/11/2025</a:t>
+              <a:t>1/13/25</a:t>
             </a:fld>
             <a:endParaRPr lang="en-US" dirty="0"/>
           </a:p>
@@ -795,7 +796,7 @@
           <a:p>
             <a:fld id="{C764DE79-268F-4C1A-8933-263129D2AF90}" type="datetimeFigureOut">
               <a:rPr lang="en-US" dirty="0"/>
-              <a:t>1/11/2025</a:t>
+              <a:t>1/13/25</a:t>
             </a:fld>
             <a:endParaRPr lang="en-US" dirty="0"/>
           </a:p>
@@ -1036,7 +1037,7 @@
           <a:p>
             <a:fld id="{C764DE79-268F-4C1A-8933-263129D2AF90}" type="datetimeFigureOut">
               <a:rPr lang="en-US" dirty="0"/>
-              <a:t>1/11/2025</a:t>
+              <a:t>1/13/25</a:t>
             </a:fld>
             <a:endParaRPr lang="en-US" dirty="0"/>
           </a:p>
@@ -1263,7 +1264,7 @@
           <a:p>
             <a:fld id="{C764DE79-268F-4C1A-8933-263129D2AF90}" type="datetimeFigureOut">
               <a:rPr lang="en-US" dirty="0"/>
-              <a:t>1/11/2025</a:t>
+              <a:t>1/13/25</a:t>
             </a:fld>
             <a:endParaRPr lang="en-US" dirty="0"/>
           </a:p>
@@ -1625,7 +1626,7 @@
           <a:p>
             <a:fld id="{C764DE79-268F-4C1A-8933-263129D2AF90}" type="datetimeFigureOut">
               <a:rPr lang="en-US" dirty="0"/>
-              <a:t>1/11/2025</a:t>
+              <a:t>1/13/25</a:t>
             </a:fld>
             <a:endParaRPr lang="en-US" dirty="0"/>
           </a:p>
@@ -1738,7 +1739,7 @@
           <a:p>
             <a:fld id="{C764DE79-268F-4C1A-8933-263129D2AF90}" type="datetimeFigureOut">
               <a:rPr lang="en-US" dirty="0"/>
-              <a:t>1/11/2025</a:t>
+              <a:t>1/13/25</a:t>
             </a:fld>
             <a:endParaRPr lang="en-US" dirty="0"/>
           </a:p>
@@ -1828,7 +1829,7 @@
           <a:p>
             <a:fld id="{C764DE79-268F-4C1A-8933-263129D2AF90}" type="datetimeFigureOut">
               <a:rPr lang="en-US" dirty="0"/>
-              <a:t>1/11/2025</a:t>
+              <a:t>1/13/25</a:t>
             </a:fld>
             <a:endParaRPr lang="en-US" dirty="0"/>
           </a:p>
@@ -2100,7 +2101,7 @@
           <a:p>
             <a:fld id="{C764DE79-268F-4C1A-8933-263129D2AF90}" type="datetimeFigureOut">
               <a:rPr lang="en-US" dirty="0"/>
-              <a:t>1/11/2025</a:t>
+              <a:t>1/13/25</a:t>
             </a:fld>
             <a:endParaRPr lang="en-US" dirty="0"/>
           </a:p>
@@ -2352,7 +2353,7 @@
           <a:p>
             <a:fld id="{C764DE79-268F-4C1A-8933-263129D2AF90}" type="datetimeFigureOut">
               <a:rPr lang="en-US" dirty="0"/>
-              <a:t>1/11/2025</a:t>
+              <a:t>1/13/25</a:t>
             </a:fld>
             <a:endParaRPr lang="en-US" dirty="0"/>
           </a:p>
@@ -2560,7 +2561,7 @@
           <a:p>
             <a:fld id="{C764DE79-268F-4C1A-8933-263129D2AF90}" type="datetimeFigureOut">
               <a:rPr lang="en-US" dirty="0"/>
-              <a:t>1/11/2025</a:t>
+              <a:t>1/13/25</a:t>
             </a:fld>
             <a:endParaRPr lang="en-US" dirty="0"/>
           </a:p>
@@ -3148,7 +3149,12 @@
             <p:ph idx="1"/>
           </p:nvPr>
         </p:nvSpPr>
-        <p:spPr/>
+        <p:spPr>
+          <a:xfrm>
+            <a:off x="838200" y="1825625"/>
+            <a:ext cx="10515600" cy="1806337"/>
+          </a:xfrm>
+        </p:spPr>
         <p:txBody>
           <a:bodyPr/>
           <a:lstStyle/>
@@ -3519,7 +3525,7 @@
         <p:spPr>
           <a:xfrm>
             <a:off x="1039332" y="3631962"/>
-            <a:ext cx="6097772" cy="1200329"/>
+            <a:ext cx="6097772" cy="923330"/>
           </a:xfrm>
           <a:prstGeom prst="rect">
             <a:avLst/>
@@ -3573,18 +3579,56 @@
               </a:rPr>
               <a:t>Monlien</a:t>
             </a:r>
-            <a:endParaRPr lang="fr-FR" sz="1800" dirty="0">
+            <a:endParaRPr lang="fr-FR" sz="1800" u="sng" dirty="0">
+              <a:solidFill>
+                <a:srgbClr val="467886"/>
+              </a:solidFill>
               <a:effectLst/>
               <a:latin typeface="Times New Roman" panose="02020603050405020304" pitchFamily="18" charset="0"/>
               <a:ea typeface="Times New Roman" panose="02020603050405020304" pitchFamily="18" charset="0"/>
             </a:endParaRPr>
           </a:p>
-          <a:p>
-            <a:endParaRPr lang="fr-FR" sz="1800" b="1" dirty="0">
-              <a:effectLst/>
-              <a:latin typeface="Times New Roman" panose="02020603050405020304" pitchFamily="18" charset="0"/>
-              <a:ea typeface="Times New Roman" panose="02020603050405020304" pitchFamily="18" charset="0"/>
-            </a:endParaRPr>
+        </p:txBody>
+      </p:sp>
+      <p:sp>
+        <p:nvSpPr>
+          <p:cNvPr id="5" name="ZoneTexte 4">
+            <a:extLst>
+              <a:ext uri="{FF2B5EF4-FFF2-40B4-BE49-F238E27FC236}">
+                <a16:creationId xmlns:a16="http://schemas.microsoft.com/office/drawing/2014/main" id="{CAAE2B92-BCA5-DD95-E736-FA0181844CFD}"/>
+              </a:ext>
+            </a:extLst>
+          </p:cNvPr>
+          <p:cNvSpPr txBox="1"/>
+          <p:nvPr/>
+        </p:nvSpPr>
+        <p:spPr>
+          <a:xfrm>
+            <a:off x="1190847" y="5178056"/>
+            <a:ext cx="3074944" cy="369332"/>
+          </a:xfrm>
+          <a:prstGeom prst="rect">
+            <a:avLst/>
+          </a:prstGeom>
+          <a:noFill/>
+        </p:spPr>
+        <p:txBody>
+          <a:bodyPr wrap="none" rtlCol="0">
+            <a:spAutoFit/>
+          </a:bodyPr>
+          <a:lstStyle/>
+          <a:p>
+            <a:r>
+              <a:rPr lang="fr-FR" dirty="0"/>
+              <a:t>Autres liens : </a:t>
+            </a:r>
+            <a:r>
+              <a:rPr lang="fr-FR" dirty="0">
+                <a:hlinkClick r:id="rId3"/>
+              </a:rPr>
+              <a:t>Liens Wikipédia</a:t>
+            </a:r>
+            <a:endParaRPr lang="fr-FR" dirty="0"/>
           </a:p>
         </p:txBody>
       </p:sp>
@@ -4031,6 +4075,160 @@
     <p:extLst>
       <p:ext uri="{BB962C8B-B14F-4D97-AF65-F5344CB8AC3E}">
         <p14:creationId xmlns:p14="http://schemas.microsoft.com/office/powerpoint/2010/main" val="102119361"/>
+      </p:ext>
+    </p:extLst>
+  </p:cSld>
+  <p:clrMapOvr>
+    <a:masterClrMapping/>
+  </p:clrMapOvr>
+</p:sld>
+</file>
+
+<file path=ppt/slides/slide4.xml><?xml version="1.0" encoding="utf-8"?>
+<p:sld xmlns:a="http://schemas.openxmlformats.org/drawingml/2006/main" xmlns:r="http://schemas.openxmlformats.org/officeDocument/2006/relationships" xmlns:p="http://schemas.openxmlformats.org/presentationml/2006/main">
+  <p:cSld>
+    <p:spTree>
+      <p:nvGrpSpPr>
+        <p:cNvPr id="1" name=""/>
+        <p:cNvGrpSpPr/>
+        <p:nvPr/>
+      </p:nvGrpSpPr>
+      <p:grpSpPr>
+        <a:xfrm>
+          <a:off x="0" y="0"/>
+          <a:ext cx="0" cy="0"/>
+          <a:chOff x="0" y="0"/>
+          <a:chExt cx="0" cy="0"/>
+        </a:xfrm>
+      </p:grpSpPr>
+      <p:sp>
+        <p:nvSpPr>
+          <p:cNvPr id="2" name="Titre 1">
+            <a:extLst>
+              <a:ext uri="{FF2B5EF4-FFF2-40B4-BE49-F238E27FC236}">
+                <a16:creationId xmlns:a16="http://schemas.microsoft.com/office/drawing/2014/main" id="{FA92B546-960F-6861-CD7E-97E33944F64B}"/>
+              </a:ext>
+            </a:extLst>
+          </p:cNvPr>
+          <p:cNvSpPr>
+            <a:spLocks noGrp="1"/>
+          </p:cNvSpPr>
+          <p:nvPr>
+            <p:ph type="title"/>
+          </p:nvPr>
+        </p:nvSpPr>
+        <p:spPr/>
+        <p:txBody>
+          <a:bodyPr/>
+          <a:lstStyle/>
+          <a:p>
+            <a:r>
+              <a:rPr lang="fr-FR" dirty="0"/>
+              <a:t>Textes</a:t>
+            </a:r>
+          </a:p>
+        </p:txBody>
+      </p:sp>
+      <p:sp>
+        <p:nvSpPr>
+          <p:cNvPr id="3" name="Espace réservé du contenu 2">
+            <a:extLst>
+              <a:ext uri="{FF2B5EF4-FFF2-40B4-BE49-F238E27FC236}">
+                <a16:creationId xmlns:a16="http://schemas.microsoft.com/office/drawing/2014/main" id="{F3FCA995-2DE3-9D18-3819-4E1B66495CB4}"/>
+              </a:ext>
+            </a:extLst>
+          </p:cNvPr>
+          <p:cNvSpPr>
+            <a:spLocks noGrp="1"/>
+          </p:cNvSpPr>
+          <p:nvPr>
+            <p:ph idx="1"/>
+          </p:nvPr>
+        </p:nvSpPr>
+        <p:spPr/>
+        <p:txBody>
+          <a:bodyPr/>
+          <a:lstStyle/>
+          <a:p>
+            <a:pPr marL="0" indent="0">
+              <a:buNone/>
+            </a:pPr>
+            <a:r>
+              <a:rPr lang="fr-FR" b="1" dirty="0"/>
+              <a:t>Texte en Gras</a:t>
+            </a:r>
+          </a:p>
+          <a:p>
+            <a:pPr marL="0" indent="0">
+              <a:buNone/>
+            </a:pPr>
+            <a:r>
+              <a:rPr lang="fr-FR" i="1" dirty="0"/>
+              <a:t>Texte en Italique</a:t>
+            </a:r>
+          </a:p>
+          <a:p>
+            <a:pPr marL="0" indent="0">
+              <a:buNone/>
+            </a:pPr>
+            <a:r>
+              <a:rPr lang="fr-FR" u="sng" dirty="0"/>
+              <a:t>Texte souligné</a:t>
+            </a:r>
+          </a:p>
+          <a:p>
+            <a:pPr marL="0" indent="0">
+              <a:buNone/>
+            </a:pPr>
+            <a:endParaRPr lang="fr-FR" u="sng" dirty="0"/>
+          </a:p>
+          <a:p>
+            <a:pPr marL="0" indent="0">
+              <a:buNone/>
+            </a:pPr>
+            <a:r>
+              <a:rPr lang="fr-FR" u="sng" dirty="0"/>
+              <a:t>Bullet:</a:t>
+            </a:r>
+          </a:p>
+          <a:p>
+            <a:r>
+              <a:rPr lang="fr-FR" u="sng" dirty="0"/>
+              <a:t>One</a:t>
+            </a:r>
+          </a:p>
+          <a:p>
+            <a:r>
+              <a:rPr lang="fr-FR" u="sng" dirty="0" err="1"/>
+              <a:t>Two</a:t>
+            </a:r>
+            <a:endParaRPr lang="fr-FR" u="sng" dirty="0"/>
+          </a:p>
+          <a:p>
+            <a:r>
+              <a:rPr lang="fr-FR" u="sng" dirty="0" err="1"/>
+              <a:t>Three</a:t>
+            </a:r>
+            <a:endParaRPr lang="fr-FR" u="sng" dirty="0"/>
+          </a:p>
+          <a:p>
+            <a:pPr marL="0" indent="0">
+              <a:buNone/>
+            </a:pPr>
+            <a:endParaRPr lang="fr-FR" u="sng" dirty="0"/>
+          </a:p>
+          <a:p>
+            <a:pPr marL="0" indent="0">
+              <a:buNone/>
+            </a:pPr>
+            <a:endParaRPr lang="fr-FR" u="sng" dirty="0"/>
+          </a:p>
+        </p:txBody>
+      </p:sp>
+    </p:spTree>
+    <p:extLst>
+      <p:ext uri="{BB962C8B-B14F-4D97-AF65-F5344CB8AC3E}">
+        <p14:creationId xmlns:p14="http://schemas.microsoft.com/office/powerpoint/2010/main" val="3650694820"/>
       </p:ext>
     </p:extLst>
   </p:cSld>

</xml_diff>